<commit_message>
new slide in presentation
</commit_message>
<xml_diff>
--- a/Ramzes Game Final Presentation.pptx
+++ b/Ramzes Game Final Presentation.pptx
@@ -13,7 +13,8 @@
     <p:sldId id="267" r:id="rId7"/>
     <p:sldId id="258" r:id="rId8"/>
     <p:sldId id="260" r:id="rId9"/>
-    <p:sldId id="262" r:id="rId10"/>
+    <p:sldId id="272" r:id="rId10"/>
+    <p:sldId id="262" r:id="rId11"/>
   </p:sldIdLst>
   <p:sldSz cx="12192000" cy="6858000"/>
   <p:notesSz cx="6858000" cy="9144000"/>
@@ -6150,6 +6151,112 @@
 </p:sld>
 </file>
 
+<file path=ppt/slides/slide10.xml><?xml version="1.0" encoding="utf-8"?>
+<p:sld xmlns:a="http://schemas.openxmlformats.org/drawingml/2006/main" xmlns:r="http://schemas.openxmlformats.org/officeDocument/2006/relationships" xmlns:p="http://schemas.openxmlformats.org/presentationml/2006/main">
+  <p:cSld>
+    <p:spTree>
+      <p:nvGrpSpPr>
+        <p:cNvPr id="1" name=""/>
+        <p:cNvGrpSpPr/>
+        <p:nvPr/>
+      </p:nvGrpSpPr>
+      <p:grpSpPr>
+        <a:xfrm>
+          <a:off x="0" y="0"/>
+          <a:ext cx="0" cy="0"/>
+          <a:chOff x="0" y="0"/>
+          <a:chExt cx="0" cy="0"/>
+        </a:xfrm>
+      </p:grpSpPr>
+      <p:sp>
+        <p:nvSpPr>
+          <p:cNvPr id="2" name="Tytuł 1">
+            <a:extLst>
+              <a:ext uri="{FF2B5EF4-FFF2-40B4-BE49-F238E27FC236}">
+                <a16:creationId xmlns:a16="http://schemas.microsoft.com/office/drawing/2014/main" id="{EAA81DB1-16C1-43CD-CF61-69C2617972B3}"/>
+              </a:ext>
+            </a:extLst>
+          </p:cNvPr>
+          <p:cNvSpPr>
+            <a:spLocks noGrp="1"/>
+          </p:cNvSpPr>
+          <p:nvPr>
+            <p:ph type="title"/>
+          </p:nvPr>
+        </p:nvSpPr>
+        <p:spPr>
+          <a:xfrm>
+            <a:off x="753644" y="2069432"/>
+            <a:ext cx="10515600" cy="1139491"/>
+          </a:xfrm>
+        </p:spPr>
+        <p:txBody>
+          <a:bodyPr/>
+          <a:lstStyle/>
+          <a:p>
+            <a:pPr algn="ctr"/>
+            <a:r>
+              <a:rPr lang="pl-PL" dirty="0">
+                <a:solidFill>
+                  <a:schemeClr val="bg1"/>
+                </a:solidFill>
+              </a:rPr>
+              <a:t>Dziękuję za uwagę</a:t>
+            </a:r>
+          </a:p>
+        </p:txBody>
+      </p:sp>
+      <p:sp>
+        <p:nvSpPr>
+          <p:cNvPr id="3" name="Symbol zastępczy tekstu 2">
+            <a:extLst>
+              <a:ext uri="{FF2B5EF4-FFF2-40B4-BE49-F238E27FC236}">
+                <a16:creationId xmlns:a16="http://schemas.microsoft.com/office/drawing/2014/main" id="{B572C13C-316C-E183-0A43-D82B23FB283D}"/>
+              </a:ext>
+            </a:extLst>
+          </p:cNvPr>
+          <p:cNvSpPr>
+            <a:spLocks noGrp="1"/>
+          </p:cNvSpPr>
+          <p:nvPr>
+            <p:ph type="body" idx="1"/>
+          </p:nvPr>
+        </p:nvSpPr>
+        <p:spPr>
+          <a:xfrm>
+            <a:off x="753644" y="3312445"/>
+            <a:ext cx="10515600" cy="1500187"/>
+          </a:xfrm>
+        </p:spPr>
+        <p:txBody>
+          <a:bodyPr/>
+          <a:lstStyle/>
+          <a:p>
+            <a:pPr algn="ctr"/>
+            <a:r>
+              <a:rPr lang="pl-PL" dirty="0">
+                <a:solidFill>
+                  <a:schemeClr val="bg1"/>
+                </a:solidFill>
+              </a:rPr>
+              <a:t>Siwiec Piotr</a:t>
+            </a:r>
+          </a:p>
+        </p:txBody>
+      </p:sp>
+    </p:spTree>
+    <p:extLst>
+      <p:ext uri="{BB962C8B-B14F-4D97-AF65-F5344CB8AC3E}">
+        <p14:creationId xmlns:p14="http://schemas.microsoft.com/office/powerpoint/2010/main" val="2389736531"/>
+      </p:ext>
+    </p:extLst>
+  </p:cSld>
+  <p:clrMapOvr>
+    <a:masterClrMapping/>
+  </p:clrMapOvr>
+</p:sld>
+</file>
+
 <file path=ppt/slides/slide2.xml><?xml version="1.0" encoding="utf-8"?>
 <p:sld xmlns:a="http://schemas.openxmlformats.org/drawingml/2006/main" xmlns:r="http://schemas.openxmlformats.org/officeDocument/2006/relationships" xmlns:p="http://schemas.openxmlformats.org/presentationml/2006/main">
   <p:cSld>
@@ -7561,7 +7668,7 @@
         </p:nvSpPr>
         <p:spPr>
           <a:xfrm>
-            <a:off x="753644" y="463216"/>
+            <a:off x="838200" y="1153027"/>
             <a:ext cx="10515600" cy="1139491"/>
           </a:xfrm>
         </p:spPr>
@@ -7576,8 +7683,37 @@
                   <a:schemeClr val="bg1"/>
                 </a:solidFill>
               </a:rPr>
-              <a:t>Link do repozytorium GitHub</a:t>
-            </a:r>
+              <a:t>Co </a:t>
+            </a:r>
+            <a:r>
+              <a:rPr lang="pl-PL" dirty="0" err="1">
+                <a:solidFill>
+                  <a:schemeClr val="bg1"/>
+                </a:solidFill>
+              </a:rPr>
+              <a:t>zmienilo</a:t>
+            </a:r>
+            <a:r>
+              <a:rPr lang="pl-PL" dirty="0">
+                <a:solidFill>
+                  <a:schemeClr val="bg1"/>
+                </a:solidFill>
+              </a:rPr>
+              <a:t> się względem poprzedniego projektu </a:t>
+            </a:r>
+            <a:r>
+              <a:rPr lang="pl-PL" dirty="0" err="1">
+                <a:solidFill>
+                  <a:schemeClr val="bg1"/>
+                </a:solidFill>
+              </a:rPr>
+              <a:t>OpenGL</a:t>
+            </a:r>
+            <a:endParaRPr lang="pl-PL" dirty="0">
+              <a:solidFill>
+                <a:schemeClr val="bg1"/>
+              </a:solidFill>
+            </a:endParaRPr>
           </a:p>
         </p:txBody>
       </p:sp>
@@ -7599,7 +7735,7 @@
         </p:nvSpPr>
         <p:spPr>
           <a:xfrm>
-            <a:off x="838200" y="1928813"/>
+            <a:off x="838200" y="2971550"/>
             <a:ext cx="10515600" cy="1500187"/>
           </a:xfrm>
         </p:spPr>
@@ -7614,11 +7750,16 @@
                   <a:schemeClr val="bg1"/>
                 </a:solidFill>
               </a:rPr>
-              <a:t>https://github.com/DarthSiwy/Ramzes-game-opengl</a:t>
-            </a:r>
-          </a:p>
-          <a:p>
-            <a:pPr algn="ctr"/>
+              <a:t>Programowanie obiektowe, dużo więcej </a:t>
+            </a:r>
+            <a:r>
+              <a:rPr lang="pl-PL" dirty="0" err="1">
+                <a:solidFill>
+                  <a:schemeClr val="bg1"/>
+                </a:solidFill>
+              </a:rPr>
+              <a:t>plikow</a:t>
+            </a:r>
             <a:endParaRPr lang="pl-PL" dirty="0">
               <a:solidFill>
                 <a:schemeClr val="bg1"/>
@@ -7675,7 +7816,7 @@
         </p:nvSpPr>
         <p:spPr>
           <a:xfrm>
-            <a:off x="753644" y="2069432"/>
+            <a:off x="753644" y="463216"/>
             <a:ext cx="10515600" cy="1139491"/>
           </a:xfrm>
         </p:spPr>
@@ -7690,7 +7831,7 @@
                   <a:schemeClr val="bg1"/>
                 </a:solidFill>
               </a:rPr>
-              <a:t>Dziękuję za uwagę</a:t>
+              <a:t>Link do repozytorium GitHub</a:t>
             </a:r>
           </a:p>
         </p:txBody>
@@ -7713,7 +7854,7 @@
         </p:nvSpPr>
         <p:spPr>
           <a:xfrm>
-            <a:off x="753644" y="3312445"/>
+            <a:off x="838200" y="1928813"/>
             <a:ext cx="10515600" cy="1500187"/>
           </a:xfrm>
         </p:spPr>
@@ -7728,15 +7869,23 @@
                   <a:schemeClr val="bg1"/>
                 </a:solidFill>
               </a:rPr>
-              <a:t>Siwiec Piotr</a:t>
-            </a:r>
+              <a:t>https://github.com/DarthSiwy/Ramzes-game-opengl</a:t>
+            </a:r>
+          </a:p>
+          <a:p>
+            <a:pPr algn="ctr"/>
+            <a:endParaRPr lang="pl-PL" dirty="0">
+              <a:solidFill>
+                <a:schemeClr val="bg1"/>
+              </a:solidFill>
+            </a:endParaRPr>
           </a:p>
         </p:txBody>
       </p:sp>
     </p:spTree>
     <p:extLst>
       <p:ext uri="{BB962C8B-B14F-4D97-AF65-F5344CB8AC3E}">
-        <p14:creationId xmlns:p14="http://schemas.microsoft.com/office/powerpoint/2010/main" val="2389736531"/>
+        <p14:creationId xmlns:p14="http://schemas.microsoft.com/office/powerpoint/2010/main" val="2385443722"/>
       </p:ext>
     </p:extLst>
   </p:cSld>

</xml_diff>